<commit_message>
first cut at presentation
</commit_message>
<xml_diff>
--- a/presentation.pptx
+++ b/presentation.pptx
@@ -4,13 +4,18 @@
   <p:sldMasterIdLst>
     <p:sldMasterId id="2147483648" r:id="rId1"/>
   </p:sldMasterIdLst>
+  <p:notesMasterIdLst>
+    <p:notesMasterId r:id="rId10"/>
+  </p:notesMasterIdLst>
   <p:sldIdLst>
     <p:sldId id="256" r:id="rId2"/>
     <p:sldId id="257" r:id="rId3"/>
     <p:sldId id="258" r:id="rId4"/>
     <p:sldId id="259" r:id="rId5"/>
-    <p:sldId id="260" r:id="rId6"/>
-    <p:sldId id="261" r:id="rId7"/>
+    <p:sldId id="265" r:id="rId6"/>
+    <p:sldId id="266" r:id="rId7"/>
+    <p:sldId id="267" r:id="rId8"/>
+    <p:sldId id="261" r:id="rId9"/>
   </p:sldIdLst>
   <p:sldSz cx="12192000" cy="6858000"/>
   <p:notesSz cx="6858000" cy="9144000"/>
@@ -110,6 +115,981 @@
     </a:lvl9pPr>
   </p:defaultTextStyle>
 </p:presentation>
+</file>
+
+<file path=ppt/commentAuthors.xml><?xml version="1.0" encoding="utf-8"?>
+<p:cmAuthorLst xmlns:a="http://schemas.openxmlformats.org/drawingml/2006/main" xmlns:r="http://schemas.openxmlformats.org/officeDocument/2006/relationships" xmlns:p="http://schemas.openxmlformats.org/presentationml/2006/main">
+  <p:cmAuthor id="1" name="Carozza, Ernie" initials="CE" lastIdx="1" clrIdx="0">
+    <p:extLst>
+      <p:ext uri="{19B8F6BF-5375-455C-9EA6-DF929625EA0E}">
+        <p15:presenceInfo xmlns:p15="http://schemas.microsoft.com/office/powerpoint/2012/main" userId="S-1-5-21-1940666338-227100268-1349548132-144825" providerId="AD"/>
+      </p:ext>
+    </p:extLst>
+  </p:cmAuthor>
+</p:cmAuthorLst>
+</file>
+
+<file path=ppt/notesMasters/notesMaster1.xml><?xml version="1.0" encoding="utf-8"?>
+<p:notesMaster xmlns:a="http://schemas.openxmlformats.org/drawingml/2006/main" xmlns:r="http://schemas.openxmlformats.org/officeDocument/2006/relationships" xmlns:p="http://schemas.openxmlformats.org/presentationml/2006/main">
+  <p:cSld>
+    <p:bg>
+      <p:bgRef idx="1001">
+        <a:schemeClr val="bg1"/>
+      </p:bgRef>
+    </p:bg>
+    <p:spTree>
+      <p:nvGrpSpPr>
+        <p:cNvPr id="1" name=""/>
+        <p:cNvGrpSpPr/>
+        <p:nvPr/>
+      </p:nvGrpSpPr>
+      <p:grpSpPr>
+        <a:xfrm>
+          <a:off x="0" y="0"/>
+          <a:ext cx="0" cy="0"/>
+          <a:chOff x="0" y="0"/>
+          <a:chExt cx="0" cy="0"/>
+        </a:xfrm>
+      </p:grpSpPr>
+      <p:sp>
+        <p:nvSpPr>
+          <p:cNvPr id="2" name="Header Placeholder 1"/>
+          <p:cNvSpPr>
+            <a:spLocks noGrp="1"/>
+          </p:cNvSpPr>
+          <p:nvPr>
+            <p:ph type="hdr" sz="quarter"/>
+          </p:nvPr>
+        </p:nvSpPr>
+        <p:spPr>
+          <a:xfrm>
+            <a:off x="0" y="0"/>
+            <a:ext cx="2971800" cy="458788"/>
+          </a:xfrm>
+          <a:prstGeom prst="rect">
+            <a:avLst/>
+          </a:prstGeom>
+        </p:spPr>
+        <p:txBody>
+          <a:bodyPr vert="horz" lIns="91440" tIns="45720" rIns="91440" bIns="45720" rtlCol="0"/>
+          <a:lstStyle>
+            <a:lvl1pPr algn="l">
+              <a:defRPr sz="1200"/>
+            </a:lvl1pPr>
+          </a:lstStyle>
+          <a:p>
+            <a:endParaRPr lang="en-US"/>
+          </a:p>
+        </p:txBody>
+      </p:sp>
+      <p:sp>
+        <p:nvSpPr>
+          <p:cNvPr id="3" name="Date Placeholder 2"/>
+          <p:cNvSpPr>
+            <a:spLocks noGrp="1"/>
+          </p:cNvSpPr>
+          <p:nvPr>
+            <p:ph type="dt" idx="1"/>
+          </p:nvPr>
+        </p:nvSpPr>
+        <p:spPr>
+          <a:xfrm>
+            <a:off x="3884613" y="0"/>
+            <a:ext cx="2971800" cy="458788"/>
+          </a:xfrm>
+          <a:prstGeom prst="rect">
+            <a:avLst/>
+          </a:prstGeom>
+        </p:spPr>
+        <p:txBody>
+          <a:bodyPr vert="horz" lIns="91440" tIns="45720" rIns="91440" bIns="45720" rtlCol="0"/>
+          <a:lstStyle>
+            <a:lvl1pPr algn="r">
+              <a:defRPr sz="1200"/>
+            </a:lvl1pPr>
+          </a:lstStyle>
+          <a:p>
+            <a:fld id="{816019C4-4BFF-45A4-A1B7-52A07E54D6DD}" type="datetimeFigureOut">
+              <a:rPr lang="en-US" smtClean="0"/>
+              <a:t>12/8/2014</a:t>
+            </a:fld>
+            <a:endParaRPr lang="en-US"/>
+          </a:p>
+        </p:txBody>
+      </p:sp>
+      <p:sp>
+        <p:nvSpPr>
+          <p:cNvPr id="4" name="Slide Image Placeholder 3"/>
+          <p:cNvSpPr>
+            <a:spLocks noGrp="1" noRot="1" noChangeAspect="1"/>
+          </p:cNvSpPr>
+          <p:nvPr>
+            <p:ph type="sldImg" idx="2"/>
+          </p:nvPr>
+        </p:nvSpPr>
+        <p:spPr>
+          <a:xfrm>
+            <a:off x="685800" y="1143000"/>
+            <a:ext cx="5486400" cy="3086100"/>
+          </a:xfrm>
+          <a:prstGeom prst="rect">
+            <a:avLst/>
+          </a:prstGeom>
+          <a:noFill/>
+          <a:ln w="12700">
+            <a:solidFill>
+              <a:prstClr val="black"/>
+            </a:solidFill>
+          </a:ln>
+        </p:spPr>
+        <p:txBody>
+          <a:bodyPr vert="horz" lIns="91440" tIns="45720" rIns="91440" bIns="45720" rtlCol="0" anchor="ctr"/>
+          <a:lstStyle/>
+          <a:p>
+            <a:endParaRPr lang="en-US"/>
+          </a:p>
+        </p:txBody>
+      </p:sp>
+      <p:sp>
+        <p:nvSpPr>
+          <p:cNvPr id="5" name="Notes Placeholder 4"/>
+          <p:cNvSpPr>
+            <a:spLocks noGrp="1"/>
+          </p:cNvSpPr>
+          <p:nvPr>
+            <p:ph type="body" sz="quarter" idx="3"/>
+          </p:nvPr>
+        </p:nvSpPr>
+        <p:spPr>
+          <a:xfrm>
+            <a:off x="685800" y="4400550"/>
+            <a:ext cx="5486400" cy="3600450"/>
+          </a:xfrm>
+          <a:prstGeom prst="rect">
+            <a:avLst/>
+          </a:prstGeom>
+        </p:spPr>
+        <p:txBody>
+          <a:bodyPr vert="horz" lIns="91440" tIns="45720" rIns="91440" bIns="45720" rtlCol="0"/>
+          <a:lstStyle/>
+          <a:p>
+            <a:pPr lvl="0"/>
+            <a:r>
+              <a:rPr lang="en-US" smtClean="0"/>
+              <a:t>Click to edit Master text styles</a:t>
+            </a:r>
+          </a:p>
+          <a:p>
+            <a:pPr lvl="1"/>
+            <a:r>
+              <a:rPr lang="en-US" smtClean="0"/>
+              <a:t>Second level</a:t>
+            </a:r>
+          </a:p>
+          <a:p>
+            <a:pPr lvl="2"/>
+            <a:r>
+              <a:rPr lang="en-US" smtClean="0"/>
+              <a:t>Third level</a:t>
+            </a:r>
+          </a:p>
+          <a:p>
+            <a:pPr lvl="3"/>
+            <a:r>
+              <a:rPr lang="en-US" smtClean="0"/>
+              <a:t>Fourth level</a:t>
+            </a:r>
+          </a:p>
+          <a:p>
+            <a:pPr lvl="4"/>
+            <a:r>
+              <a:rPr lang="en-US" smtClean="0"/>
+              <a:t>Fifth level</a:t>
+            </a:r>
+            <a:endParaRPr lang="en-US"/>
+          </a:p>
+        </p:txBody>
+      </p:sp>
+      <p:sp>
+        <p:nvSpPr>
+          <p:cNvPr id="6" name="Footer Placeholder 5"/>
+          <p:cNvSpPr>
+            <a:spLocks noGrp="1"/>
+          </p:cNvSpPr>
+          <p:nvPr>
+            <p:ph type="ftr" sz="quarter" idx="4"/>
+          </p:nvPr>
+        </p:nvSpPr>
+        <p:spPr>
+          <a:xfrm>
+            <a:off x="0" y="8685213"/>
+            <a:ext cx="2971800" cy="458787"/>
+          </a:xfrm>
+          <a:prstGeom prst="rect">
+            <a:avLst/>
+          </a:prstGeom>
+        </p:spPr>
+        <p:txBody>
+          <a:bodyPr vert="horz" lIns="91440" tIns="45720" rIns="91440" bIns="45720" rtlCol="0" anchor="b"/>
+          <a:lstStyle>
+            <a:lvl1pPr algn="l">
+              <a:defRPr sz="1200"/>
+            </a:lvl1pPr>
+          </a:lstStyle>
+          <a:p>
+            <a:endParaRPr lang="en-US"/>
+          </a:p>
+        </p:txBody>
+      </p:sp>
+      <p:sp>
+        <p:nvSpPr>
+          <p:cNvPr id="7" name="Slide Number Placeholder 6"/>
+          <p:cNvSpPr>
+            <a:spLocks noGrp="1"/>
+          </p:cNvSpPr>
+          <p:nvPr>
+            <p:ph type="sldNum" sz="quarter" idx="5"/>
+          </p:nvPr>
+        </p:nvSpPr>
+        <p:spPr>
+          <a:xfrm>
+            <a:off x="3884613" y="8685213"/>
+            <a:ext cx="2971800" cy="458787"/>
+          </a:xfrm>
+          <a:prstGeom prst="rect">
+            <a:avLst/>
+          </a:prstGeom>
+        </p:spPr>
+        <p:txBody>
+          <a:bodyPr vert="horz" lIns="91440" tIns="45720" rIns="91440" bIns="45720" rtlCol="0" anchor="b"/>
+          <a:lstStyle>
+            <a:lvl1pPr algn="r">
+              <a:defRPr sz="1200"/>
+            </a:lvl1pPr>
+          </a:lstStyle>
+          <a:p>
+            <a:fld id="{280B9B96-5504-45C4-A7D4-ABBE9FEDE67C}" type="slidenum">
+              <a:rPr lang="en-US" smtClean="0"/>
+              <a:t>‹#›</a:t>
+            </a:fld>
+            <a:endParaRPr lang="en-US"/>
+          </a:p>
+        </p:txBody>
+      </p:sp>
+    </p:spTree>
+    <p:extLst>
+      <p:ext uri="{BB962C8B-B14F-4D97-AF65-F5344CB8AC3E}">
+        <p14:creationId xmlns:p14="http://schemas.microsoft.com/office/powerpoint/2010/main" val="4173729401"/>
+      </p:ext>
+    </p:extLst>
+  </p:cSld>
+  <p:clrMap bg1="lt1" tx1="dk1" bg2="lt2" tx2="dk2" accent1="accent1" accent2="accent2" accent3="accent3" accent4="accent4" accent5="accent5" accent6="accent6" hlink="hlink" folHlink="folHlink"/>
+  <p:notesStyle>
+    <a:lvl1pPr marL="0" algn="l" defTabSz="914400" rtl="0" eaLnBrk="1" latinLnBrk="0" hangingPunct="1">
+      <a:defRPr sz="1200" kern="1200">
+        <a:solidFill>
+          <a:schemeClr val="tx1"/>
+        </a:solidFill>
+        <a:latin typeface="+mn-lt"/>
+        <a:ea typeface="+mn-ea"/>
+        <a:cs typeface="+mn-cs"/>
+      </a:defRPr>
+    </a:lvl1pPr>
+    <a:lvl2pPr marL="457200" algn="l" defTabSz="914400" rtl="0" eaLnBrk="1" latinLnBrk="0" hangingPunct="1">
+      <a:defRPr sz="1200" kern="1200">
+        <a:solidFill>
+          <a:schemeClr val="tx1"/>
+        </a:solidFill>
+        <a:latin typeface="+mn-lt"/>
+        <a:ea typeface="+mn-ea"/>
+        <a:cs typeface="+mn-cs"/>
+      </a:defRPr>
+    </a:lvl2pPr>
+    <a:lvl3pPr marL="914400" algn="l" defTabSz="914400" rtl="0" eaLnBrk="1" latinLnBrk="0" hangingPunct="1">
+      <a:defRPr sz="1200" kern="1200">
+        <a:solidFill>
+          <a:schemeClr val="tx1"/>
+        </a:solidFill>
+        <a:latin typeface="+mn-lt"/>
+        <a:ea typeface="+mn-ea"/>
+        <a:cs typeface="+mn-cs"/>
+      </a:defRPr>
+    </a:lvl3pPr>
+    <a:lvl4pPr marL="1371600" algn="l" defTabSz="914400" rtl="0" eaLnBrk="1" latinLnBrk="0" hangingPunct="1">
+      <a:defRPr sz="1200" kern="1200">
+        <a:solidFill>
+          <a:schemeClr val="tx1"/>
+        </a:solidFill>
+        <a:latin typeface="+mn-lt"/>
+        <a:ea typeface="+mn-ea"/>
+        <a:cs typeface="+mn-cs"/>
+      </a:defRPr>
+    </a:lvl4pPr>
+    <a:lvl5pPr marL="1828800" algn="l" defTabSz="914400" rtl="0" eaLnBrk="1" latinLnBrk="0" hangingPunct="1">
+      <a:defRPr sz="1200" kern="1200">
+        <a:solidFill>
+          <a:schemeClr val="tx1"/>
+        </a:solidFill>
+        <a:latin typeface="+mn-lt"/>
+        <a:ea typeface="+mn-ea"/>
+        <a:cs typeface="+mn-cs"/>
+      </a:defRPr>
+    </a:lvl5pPr>
+    <a:lvl6pPr marL="2286000" algn="l" defTabSz="914400" rtl="0" eaLnBrk="1" latinLnBrk="0" hangingPunct="1">
+      <a:defRPr sz="1200" kern="1200">
+        <a:solidFill>
+          <a:schemeClr val="tx1"/>
+        </a:solidFill>
+        <a:latin typeface="+mn-lt"/>
+        <a:ea typeface="+mn-ea"/>
+        <a:cs typeface="+mn-cs"/>
+      </a:defRPr>
+    </a:lvl6pPr>
+    <a:lvl7pPr marL="2743200" algn="l" defTabSz="914400" rtl="0" eaLnBrk="1" latinLnBrk="0" hangingPunct="1">
+      <a:defRPr sz="1200" kern="1200">
+        <a:solidFill>
+          <a:schemeClr val="tx1"/>
+        </a:solidFill>
+        <a:latin typeface="+mn-lt"/>
+        <a:ea typeface="+mn-ea"/>
+        <a:cs typeface="+mn-cs"/>
+      </a:defRPr>
+    </a:lvl7pPr>
+    <a:lvl8pPr marL="3200400" algn="l" defTabSz="914400" rtl="0" eaLnBrk="1" latinLnBrk="0" hangingPunct="1">
+      <a:defRPr sz="1200" kern="1200">
+        <a:solidFill>
+          <a:schemeClr val="tx1"/>
+        </a:solidFill>
+        <a:latin typeface="+mn-lt"/>
+        <a:ea typeface="+mn-ea"/>
+        <a:cs typeface="+mn-cs"/>
+      </a:defRPr>
+    </a:lvl8pPr>
+    <a:lvl9pPr marL="3657600" algn="l" defTabSz="914400" rtl="0" eaLnBrk="1" latinLnBrk="0" hangingPunct="1">
+      <a:defRPr sz="1200" kern="1200">
+        <a:solidFill>
+          <a:schemeClr val="tx1"/>
+        </a:solidFill>
+        <a:latin typeface="+mn-lt"/>
+        <a:ea typeface="+mn-ea"/>
+        <a:cs typeface="+mn-cs"/>
+      </a:defRPr>
+    </a:lvl9pPr>
+  </p:notesStyle>
+</p:notesMaster>
+</file>
+
+<file path=ppt/notesSlides/notesSlide1.xml><?xml version="1.0" encoding="utf-8"?>
+<p:notes xmlns:a="http://schemas.openxmlformats.org/drawingml/2006/main" xmlns:r="http://schemas.openxmlformats.org/officeDocument/2006/relationships" xmlns:p="http://schemas.openxmlformats.org/presentationml/2006/main">
+  <p:cSld>
+    <p:spTree>
+      <p:nvGrpSpPr>
+        <p:cNvPr id="1" name=""/>
+        <p:cNvGrpSpPr/>
+        <p:nvPr/>
+      </p:nvGrpSpPr>
+      <p:grpSpPr>
+        <a:xfrm>
+          <a:off x="0" y="0"/>
+          <a:ext cx="0" cy="0"/>
+          <a:chOff x="0" y="0"/>
+          <a:chExt cx="0" cy="0"/>
+        </a:xfrm>
+      </p:grpSpPr>
+      <p:sp>
+        <p:nvSpPr>
+          <p:cNvPr id="2" name="Slide Image Placeholder 1"/>
+          <p:cNvSpPr>
+            <a:spLocks noGrp="1" noRot="1" noChangeAspect="1"/>
+          </p:cNvSpPr>
+          <p:nvPr>
+            <p:ph type="sldImg"/>
+          </p:nvPr>
+        </p:nvSpPr>
+        <p:spPr/>
+      </p:sp>
+      <p:sp>
+        <p:nvSpPr>
+          <p:cNvPr id="3" name="Notes Placeholder 2"/>
+          <p:cNvSpPr>
+            <a:spLocks noGrp="1"/>
+          </p:cNvSpPr>
+          <p:nvPr>
+            <p:ph type="body" idx="1"/>
+          </p:nvPr>
+        </p:nvSpPr>
+        <p:spPr/>
+        <p:txBody>
+          <a:bodyPr/>
+          <a:lstStyle/>
+          <a:p>
+            <a:r>
+              <a:rPr lang="en-US" dirty="0" smtClean="0"/>
+              <a:t>Aim for 1 minute</a:t>
+            </a:r>
+          </a:p>
+        </p:txBody>
+      </p:sp>
+      <p:sp>
+        <p:nvSpPr>
+          <p:cNvPr id="4" name="Slide Number Placeholder 3"/>
+          <p:cNvSpPr>
+            <a:spLocks noGrp="1"/>
+          </p:cNvSpPr>
+          <p:nvPr>
+            <p:ph type="sldNum" sz="quarter" idx="10"/>
+          </p:nvPr>
+        </p:nvSpPr>
+        <p:spPr/>
+        <p:txBody>
+          <a:bodyPr/>
+          <a:lstStyle/>
+          <a:p>
+            <a:fld id="{280B9B96-5504-45C4-A7D4-ABBE9FEDE67C}" type="slidenum">
+              <a:rPr lang="en-US" smtClean="0"/>
+              <a:t>2</a:t>
+            </a:fld>
+            <a:endParaRPr lang="en-US"/>
+          </a:p>
+        </p:txBody>
+      </p:sp>
+    </p:spTree>
+    <p:extLst>
+      <p:ext uri="{BB962C8B-B14F-4D97-AF65-F5344CB8AC3E}">
+        <p14:creationId xmlns:p14="http://schemas.microsoft.com/office/powerpoint/2010/main" val="2620938586"/>
+      </p:ext>
+    </p:extLst>
+  </p:cSld>
+  <p:clrMapOvr>
+    <a:masterClrMapping/>
+  </p:clrMapOvr>
+</p:notes>
+</file>
+
+<file path=ppt/notesSlides/notesSlide2.xml><?xml version="1.0" encoding="utf-8"?>
+<p:notes xmlns:a="http://schemas.openxmlformats.org/drawingml/2006/main" xmlns:r="http://schemas.openxmlformats.org/officeDocument/2006/relationships" xmlns:p="http://schemas.openxmlformats.org/presentationml/2006/main">
+  <p:cSld>
+    <p:spTree>
+      <p:nvGrpSpPr>
+        <p:cNvPr id="1" name=""/>
+        <p:cNvGrpSpPr/>
+        <p:nvPr/>
+      </p:nvGrpSpPr>
+      <p:grpSpPr>
+        <a:xfrm>
+          <a:off x="0" y="0"/>
+          <a:ext cx="0" cy="0"/>
+          <a:chOff x="0" y="0"/>
+          <a:chExt cx="0" cy="0"/>
+        </a:xfrm>
+      </p:grpSpPr>
+      <p:sp>
+        <p:nvSpPr>
+          <p:cNvPr id="2" name="Slide Image Placeholder 1"/>
+          <p:cNvSpPr>
+            <a:spLocks noGrp="1" noRot="1" noChangeAspect="1"/>
+          </p:cNvSpPr>
+          <p:nvPr>
+            <p:ph type="sldImg"/>
+          </p:nvPr>
+        </p:nvSpPr>
+        <p:spPr/>
+      </p:sp>
+      <p:sp>
+        <p:nvSpPr>
+          <p:cNvPr id="3" name="Notes Placeholder 2"/>
+          <p:cNvSpPr>
+            <a:spLocks noGrp="1"/>
+          </p:cNvSpPr>
+          <p:nvPr>
+            <p:ph type="body" idx="1"/>
+          </p:nvPr>
+        </p:nvSpPr>
+        <p:spPr/>
+        <p:txBody>
+          <a:bodyPr/>
+          <a:lstStyle/>
+          <a:p>
+            <a:r>
+              <a:rPr lang="en-US" dirty="0" smtClean="0"/>
+              <a:t>Aim for 2 minutes</a:t>
+            </a:r>
+          </a:p>
+          <a:p>
+            <a:r>
+              <a:rPr lang="en-US" dirty="0" smtClean="0"/>
+              <a:t>Precise definitions</a:t>
+            </a:r>
+          </a:p>
+          <a:p>
+            <a:r>
+              <a:rPr lang="en-US" dirty="0" smtClean="0"/>
+              <a:t>Formulas/mathematical models</a:t>
+            </a:r>
+          </a:p>
+          <a:p>
+            <a:r>
+              <a:rPr lang="en-US" dirty="0" smtClean="0"/>
+              <a:t>Specific goal</a:t>
+            </a:r>
+          </a:p>
+          <a:p>
+            <a:endParaRPr lang="en-US" dirty="0"/>
+          </a:p>
+        </p:txBody>
+      </p:sp>
+      <p:sp>
+        <p:nvSpPr>
+          <p:cNvPr id="4" name="Slide Number Placeholder 3"/>
+          <p:cNvSpPr>
+            <a:spLocks noGrp="1"/>
+          </p:cNvSpPr>
+          <p:nvPr>
+            <p:ph type="sldNum" sz="quarter" idx="10"/>
+          </p:nvPr>
+        </p:nvSpPr>
+        <p:spPr/>
+        <p:txBody>
+          <a:bodyPr/>
+          <a:lstStyle/>
+          <a:p>
+            <a:fld id="{280B9B96-5504-45C4-A7D4-ABBE9FEDE67C}" type="slidenum">
+              <a:rPr lang="en-US" smtClean="0"/>
+              <a:t>3</a:t>
+            </a:fld>
+            <a:endParaRPr lang="en-US"/>
+          </a:p>
+        </p:txBody>
+      </p:sp>
+    </p:spTree>
+    <p:extLst>
+      <p:ext uri="{BB962C8B-B14F-4D97-AF65-F5344CB8AC3E}">
+        <p14:creationId xmlns:p14="http://schemas.microsoft.com/office/powerpoint/2010/main" val="2506946222"/>
+      </p:ext>
+    </p:extLst>
+  </p:cSld>
+  <p:clrMapOvr>
+    <a:masterClrMapping/>
+  </p:clrMapOvr>
+</p:notes>
+</file>
+
+<file path=ppt/notesSlides/notesSlide3.xml><?xml version="1.0" encoding="utf-8"?>
+<p:notes xmlns:a="http://schemas.openxmlformats.org/drawingml/2006/main" xmlns:r="http://schemas.openxmlformats.org/officeDocument/2006/relationships" xmlns:p="http://schemas.openxmlformats.org/presentationml/2006/main">
+  <p:cSld>
+    <p:spTree>
+      <p:nvGrpSpPr>
+        <p:cNvPr id="1" name=""/>
+        <p:cNvGrpSpPr/>
+        <p:nvPr/>
+      </p:nvGrpSpPr>
+      <p:grpSpPr>
+        <a:xfrm>
+          <a:off x="0" y="0"/>
+          <a:ext cx="0" cy="0"/>
+          <a:chOff x="0" y="0"/>
+          <a:chExt cx="0" cy="0"/>
+        </a:xfrm>
+      </p:grpSpPr>
+      <p:sp>
+        <p:nvSpPr>
+          <p:cNvPr id="2" name="Slide Image Placeholder 1"/>
+          <p:cNvSpPr>
+            <a:spLocks noGrp="1" noRot="1" noChangeAspect="1"/>
+          </p:cNvSpPr>
+          <p:nvPr>
+            <p:ph type="sldImg"/>
+          </p:nvPr>
+        </p:nvSpPr>
+        <p:spPr/>
+      </p:sp>
+      <p:sp>
+        <p:nvSpPr>
+          <p:cNvPr id="3" name="Notes Placeholder 2"/>
+          <p:cNvSpPr>
+            <a:spLocks noGrp="1"/>
+          </p:cNvSpPr>
+          <p:nvPr>
+            <p:ph type="body" idx="1"/>
+          </p:nvPr>
+        </p:nvSpPr>
+        <p:spPr/>
+        <p:txBody>
+          <a:bodyPr/>
+          <a:lstStyle/>
+          <a:p>
+            <a:r>
+              <a:rPr lang="en-US" dirty="0" smtClean="0"/>
+              <a:t>Aim for 3 minutes</a:t>
+            </a:r>
+          </a:p>
+          <a:p>
+            <a:r>
+              <a:rPr lang="en-US" dirty="0" smtClean="0"/>
+              <a:t>Main ideas used to tackle the problem</a:t>
+            </a:r>
+          </a:p>
+          <a:p>
+            <a:r>
+              <a:rPr lang="en-US" dirty="0" smtClean="0"/>
+              <a:t>Key equations</a:t>
+            </a:r>
+          </a:p>
+          <a:p>
+            <a:endParaRPr lang="en-US" dirty="0"/>
+          </a:p>
+        </p:txBody>
+      </p:sp>
+      <p:sp>
+        <p:nvSpPr>
+          <p:cNvPr id="4" name="Slide Number Placeholder 3"/>
+          <p:cNvSpPr>
+            <a:spLocks noGrp="1"/>
+          </p:cNvSpPr>
+          <p:nvPr>
+            <p:ph type="sldNum" sz="quarter" idx="10"/>
+          </p:nvPr>
+        </p:nvSpPr>
+        <p:spPr/>
+        <p:txBody>
+          <a:bodyPr/>
+          <a:lstStyle/>
+          <a:p>
+            <a:fld id="{280B9B96-5504-45C4-A7D4-ABBE9FEDE67C}" type="slidenum">
+              <a:rPr lang="en-US" smtClean="0"/>
+              <a:t>4</a:t>
+            </a:fld>
+            <a:endParaRPr lang="en-US"/>
+          </a:p>
+        </p:txBody>
+      </p:sp>
+    </p:spTree>
+    <p:extLst>
+      <p:ext uri="{BB962C8B-B14F-4D97-AF65-F5344CB8AC3E}">
+        <p14:creationId xmlns:p14="http://schemas.microsoft.com/office/powerpoint/2010/main" val="1211185736"/>
+      </p:ext>
+    </p:extLst>
+  </p:cSld>
+  <p:clrMapOvr>
+    <a:masterClrMapping/>
+  </p:clrMapOvr>
+</p:notes>
+</file>
+
+<file path=ppt/notesSlides/notesSlide4.xml><?xml version="1.0" encoding="utf-8"?>
+<p:notes xmlns:a="http://schemas.openxmlformats.org/drawingml/2006/main" xmlns:r="http://schemas.openxmlformats.org/officeDocument/2006/relationships" xmlns:p="http://schemas.openxmlformats.org/presentationml/2006/main">
+  <p:cSld>
+    <p:spTree>
+      <p:nvGrpSpPr>
+        <p:cNvPr id="1" name=""/>
+        <p:cNvGrpSpPr/>
+        <p:nvPr/>
+      </p:nvGrpSpPr>
+      <p:grpSpPr>
+        <a:xfrm>
+          <a:off x="0" y="0"/>
+          <a:ext cx="0" cy="0"/>
+          <a:chOff x="0" y="0"/>
+          <a:chExt cx="0" cy="0"/>
+        </a:xfrm>
+      </p:grpSpPr>
+      <p:sp>
+        <p:nvSpPr>
+          <p:cNvPr id="2" name="Slide Image Placeholder 1"/>
+          <p:cNvSpPr>
+            <a:spLocks noGrp="1" noRot="1" noChangeAspect="1"/>
+          </p:cNvSpPr>
+          <p:nvPr>
+            <p:ph type="sldImg"/>
+          </p:nvPr>
+        </p:nvSpPr>
+        <p:spPr/>
+      </p:sp>
+      <p:sp>
+        <p:nvSpPr>
+          <p:cNvPr id="3" name="Notes Placeholder 2"/>
+          <p:cNvSpPr>
+            <a:spLocks noGrp="1"/>
+          </p:cNvSpPr>
+          <p:nvPr>
+            <p:ph type="body" idx="1"/>
+          </p:nvPr>
+        </p:nvSpPr>
+        <p:spPr/>
+        <p:txBody>
+          <a:bodyPr/>
+          <a:lstStyle/>
+          <a:p>
+            <a:r>
+              <a:rPr lang="en-US" dirty="0" smtClean="0"/>
+              <a:t>Aim for 1-2 minutes</a:t>
+            </a:r>
+          </a:p>
+          <a:p>
+            <a:r>
+              <a:rPr lang="en-US" dirty="0" smtClean="0"/>
+              <a:t>Why were these simulations chosen?</a:t>
+            </a:r>
+          </a:p>
+          <a:p>
+            <a:r>
+              <a:rPr lang="en-US" dirty="0" smtClean="0"/>
+              <a:t>Clear descriptions of parameter choices</a:t>
+            </a:r>
+          </a:p>
+          <a:p>
+            <a:r>
+              <a:rPr lang="en-US" dirty="0" smtClean="0"/>
+              <a:t>Discuss what the plots mean</a:t>
+            </a:r>
+          </a:p>
+          <a:p>
+            <a:r>
+              <a:rPr lang="en-US" dirty="0" smtClean="0"/>
+              <a:t>Do the plots match the papers? If not, why?</a:t>
+            </a:r>
+          </a:p>
+          <a:p>
+            <a:endParaRPr lang="en-US" dirty="0"/>
+          </a:p>
+        </p:txBody>
+      </p:sp>
+      <p:sp>
+        <p:nvSpPr>
+          <p:cNvPr id="4" name="Slide Number Placeholder 3"/>
+          <p:cNvSpPr>
+            <a:spLocks noGrp="1"/>
+          </p:cNvSpPr>
+          <p:nvPr>
+            <p:ph type="sldNum" sz="quarter" idx="10"/>
+          </p:nvPr>
+        </p:nvSpPr>
+        <p:spPr/>
+        <p:txBody>
+          <a:bodyPr/>
+          <a:lstStyle/>
+          <a:p>
+            <a:fld id="{280B9B96-5504-45C4-A7D4-ABBE9FEDE67C}" type="slidenum">
+              <a:rPr lang="en-US" smtClean="0"/>
+              <a:t>5</a:t>
+            </a:fld>
+            <a:endParaRPr lang="en-US"/>
+          </a:p>
+        </p:txBody>
+      </p:sp>
+    </p:spTree>
+    <p:extLst>
+      <p:ext uri="{BB962C8B-B14F-4D97-AF65-F5344CB8AC3E}">
+        <p14:creationId xmlns:p14="http://schemas.microsoft.com/office/powerpoint/2010/main" val="1791085371"/>
+      </p:ext>
+    </p:extLst>
+  </p:cSld>
+  <p:clrMapOvr>
+    <a:masterClrMapping/>
+  </p:clrMapOvr>
+</p:notes>
+</file>
+
+<file path=ppt/notesSlides/notesSlide5.xml><?xml version="1.0" encoding="utf-8"?>
+<p:notes xmlns:a="http://schemas.openxmlformats.org/drawingml/2006/main" xmlns:r="http://schemas.openxmlformats.org/officeDocument/2006/relationships" xmlns:p="http://schemas.openxmlformats.org/presentationml/2006/main">
+  <p:cSld>
+    <p:spTree>
+      <p:nvGrpSpPr>
+        <p:cNvPr id="1" name=""/>
+        <p:cNvGrpSpPr/>
+        <p:nvPr/>
+      </p:nvGrpSpPr>
+      <p:grpSpPr>
+        <a:xfrm>
+          <a:off x="0" y="0"/>
+          <a:ext cx="0" cy="0"/>
+          <a:chOff x="0" y="0"/>
+          <a:chExt cx="0" cy="0"/>
+        </a:xfrm>
+      </p:grpSpPr>
+      <p:sp>
+        <p:nvSpPr>
+          <p:cNvPr id="2" name="Slide Image Placeholder 1"/>
+          <p:cNvSpPr>
+            <a:spLocks noGrp="1" noRot="1" noChangeAspect="1"/>
+          </p:cNvSpPr>
+          <p:nvPr>
+            <p:ph type="sldImg"/>
+          </p:nvPr>
+        </p:nvSpPr>
+        <p:spPr/>
+      </p:sp>
+      <p:sp>
+        <p:nvSpPr>
+          <p:cNvPr id="3" name="Notes Placeholder 2"/>
+          <p:cNvSpPr>
+            <a:spLocks noGrp="1"/>
+          </p:cNvSpPr>
+          <p:nvPr>
+            <p:ph type="body" idx="1"/>
+          </p:nvPr>
+        </p:nvSpPr>
+        <p:spPr/>
+        <p:txBody>
+          <a:bodyPr/>
+          <a:lstStyle/>
+          <a:p>
+            <a:r>
+              <a:rPr lang="en-US" dirty="0" smtClean="0"/>
+              <a:t>Aim for 1-2 minutes</a:t>
+            </a:r>
+          </a:p>
+          <a:p>
+            <a:r>
+              <a:rPr lang="en-US" dirty="0" smtClean="0"/>
+              <a:t>Why were these simulations chosen?</a:t>
+            </a:r>
+          </a:p>
+          <a:p>
+            <a:r>
+              <a:rPr lang="en-US" dirty="0" smtClean="0"/>
+              <a:t>Clear descriptions of parameter choices</a:t>
+            </a:r>
+          </a:p>
+          <a:p>
+            <a:r>
+              <a:rPr lang="en-US" dirty="0" smtClean="0"/>
+              <a:t>Discuss what the plots mean</a:t>
+            </a:r>
+          </a:p>
+          <a:p>
+            <a:r>
+              <a:rPr lang="en-US" dirty="0" smtClean="0"/>
+              <a:t>Do the plots match the papers? If not, why?</a:t>
+            </a:r>
+          </a:p>
+          <a:p>
+            <a:endParaRPr lang="en-US" dirty="0"/>
+          </a:p>
+        </p:txBody>
+      </p:sp>
+      <p:sp>
+        <p:nvSpPr>
+          <p:cNvPr id="4" name="Slide Number Placeholder 3"/>
+          <p:cNvSpPr>
+            <a:spLocks noGrp="1"/>
+          </p:cNvSpPr>
+          <p:nvPr>
+            <p:ph type="sldNum" sz="quarter" idx="10"/>
+          </p:nvPr>
+        </p:nvSpPr>
+        <p:spPr/>
+        <p:txBody>
+          <a:bodyPr/>
+          <a:lstStyle/>
+          <a:p>
+            <a:fld id="{280B9B96-5504-45C4-A7D4-ABBE9FEDE67C}" type="slidenum">
+              <a:rPr lang="en-US" smtClean="0"/>
+              <a:t>7</a:t>
+            </a:fld>
+            <a:endParaRPr lang="en-US"/>
+          </a:p>
+        </p:txBody>
+      </p:sp>
+    </p:spTree>
+    <p:extLst>
+      <p:ext uri="{BB962C8B-B14F-4D97-AF65-F5344CB8AC3E}">
+        <p14:creationId xmlns:p14="http://schemas.microsoft.com/office/powerpoint/2010/main" val="1776450908"/>
+      </p:ext>
+    </p:extLst>
+  </p:cSld>
+  <p:clrMapOvr>
+    <a:masterClrMapping/>
+  </p:clrMapOvr>
+</p:notes>
+</file>
+
+<file path=ppt/notesSlides/notesSlide6.xml><?xml version="1.0" encoding="utf-8"?>
+<p:notes xmlns:a="http://schemas.openxmlformats.org/drawingml/2006/main" xmlns:r="http://schemas.openxmlformats.org/officeDocument/2006/relationships" xmlns:p="http://schemas.openxmlformats.org/presentationml/2006/main">
+  <p:cSld>
+    <p:spTree>
+      <p:nvGrpSpPr>
+        <p:cNvPr id="1" name=""/>
+        <p:cNvGrpSpPr/>
+        <p:nvPr/>
+      </p:nvGrpSpPr>
+      <p:grpSpPr>
+        <a:xfrm>
+          <a:off x="0" y="0"/>
+          <a:ext cx="0" cy="0"/>
+          <a:chOff x="0" y="0"/>
+          <a:chExt cx="0" cy="0"/>
+        </a:xfrm>
+      </p:grpSpPr>
+      <p:sp>
+        <p:nvSpPr>
+          <p:cNvPr id="2" name="Slide Image Placeholder 1"/>
+          <p:cNvSpPr>
+            <a:spLocks noGrp="1" noRot="1" noChangeAspect="1"/>
+          </p:cNvSpPr>
+          <p:nvPr>
+            <p:ph type="sldImg"/>
+          </p:nvPr>
+        </p:nvSpPr>
+        <p:spPr/>
+      </p:sp>
+      <p:sp>
+        <p:nvSpPr>
+          <p:cNvPr id="3" name="Notes Placeholder 2"/>
+          <p:cNvSpPr>
+            <a:spLocks noGrp="1"/>
+          </p:cNvSpPr>
+          <p:nvPr>
+            <p:ph type="body" idx="1"/>
+          </p:nvPr>
+        </p:nvSpPr>
+        <p:spPr/>
+        <p:txBody>
+          <a:bodyPr/>
+          <a:lstStyle/>
+          <a:p>
+            <a:r>
+              <a:rPr lang="en-US" dirty="0" smtClean="0"/>
+              <a:t>Aim for 1 minute</a:t>
+            </a:r>
+            <a:endParaRPr lang="en-US" dirty="0"/>
+          </a:p>
+        </p:txBody>
+      </p:sp>
+      <p:sp>
+        <p:nvSpPr>
+          <p:cNvPr id="4" name="Slide Number Placeholder 3"/>
+          <p:cNvSpPr>
+            <a:spLocks noGrp="1"/>
+          </p:cNvSpPr>
+          <p:nvPr>
+            <p:ph type="sldNum" sz="quarter" idx="10"/>
+          </p:nvPr>
+        </p:nvSpPr>
+        <p:spPr/>
+        <p:txBody>
+          <a:bodyPr/>
+          <a:lstStyle/>
+          <a:p>
+            <a:fld id="{280B9B96-5504-45C4-A7D4-ABBE9FEDE67C}" type="slidenum">
+              <a:rPr lang="en-US" smtClean="0"/>
+              <a:t>8</a:t>
+            </a:fld>
+            <a:endParaRPr lang="en-US"/>
+          </a:p>
+        </p:txBody>
+      </p:sp>
+    </p:spTree>
+    <p:extLst>
+      <p:ext uri="{BB962C8B-B14F-4D97-AF65-F5344CB8AC3E}">
+        <p14:creationId xmlns:p14="http://schemas.microsoft.com/office/powerpoint/2010/main" val="1619926959"/>
+      </p:ext>
+    </p:extLst>
+  </p:cSld>
+  <p:clrMapOvr>
+    <a:masterClrMapping/>
+  </p:clrMapOvr>
+</p:notes>
 </file>
 
 <file path=ppt/slideLayouts/slideLayout1.xml><?xml version="1.0" encoding="utf-8"?>
@@ -3074,7 +4054,7 @@
           <a:p>
             <a:r>
               <a:rPr lang="en-US" dirty="0" smtClean="0"/>
-              <a:t>Introduction and Motivation (1 minute)</a:t>
+              <a:t>Introduction and Motivation</a:t>
             </a:r>
             <a:endParaRPr lang="en-US" dirty="0"/>
           </a:p>
@@ -3097,14 +4077,55 @@
           <a:p>
             <a:r>
               <a:rPr lang="en-US" dirty="0" smtClean="0"/>
-              <a:t>Why is topic interesting/important</a:t>
-            </a:r>
-          </a:p>
-          <a:p>
+              <a:t>Indoor localization has many applications</a:t>
+            </a:r>
+          </a:p>
+          <a:p>
+            <a:pPr lvl="1"/>
             <a:r>
               <a:rPr lang="en-US" dirty="0" smtClean="0"/>
-              <a:t>Main references</a:t>
-            </a:r>
+              <a:t>Supplement to GPS in absence of line of sight to satellites</a:t>
+            </a:r>
+          </a:p>
+          <a:p>
+            <a:pPr lvl="1"/>
+            <a:r>
+              <a:rPr lang="en-US" dirty="0" smtClean="0"/>
+              <a:t>Tracking equipment in factory</a:t>
+            </a:r>
+          </a:p>
+          <a:p>
+            <a:pPr lvl="1"/>
+            <a:r>
+              <a:rPr lang="en-US" dirty="0" smtClean="0"/>
+              <a:t>Search and rescue</a:t>
+            </a:r>
+          </a:p>
+          <a:p>
+            <a:pPr lvl="1"/>
+            <a:r>
+              <a:rPr lang="en-US" dirty="0" smtClean="0"/>
+              <a:t>Law enforcement</a:t>
+            </a:r>
+            <a:endParaRPr lang="en-US" dirty="0"/>
+          </a:p>
+          <a:p>
+            <a:r>
+              <a:rPr lang="en-US" dirty="0" err="1" smtClean="0"/>
+              <a:t>WiFi</a:t>
+            </a:r>
+            <a:r>
+              <a:rPr lang="en-US" dirty="0" smtClean="0"/>
+              <a:t> is widely used in homes and offices, transmissions reflecting off walls, furniture, people all the time</a:t>
+            </a:r>
+          </a:p>
+          <a:p>
+            <a:r>
+              <a:rPr lang="en-US" dirty="0" smtClean="0"/>
+              <a:t>Analyzing fading can lead to information about objects’ position and movement</a:t>
+            </a:r>
+          </a:p>
+          <a:p>
             <a:endParaRPr lang="en-US" dirty="0"/>
           </a:p>
         </p:txBody>
@@ -3156,7 +4177,7 @@
           <a:p>
             <a:r>
               <a:rPr lang="en-US" dirty="0" smtClean="0"/>
-              <a:t>Problem Statement (2 minutes)</a:t>
+              <a:t>Problem Statement</a:t>
             </a:r>
             <a:endParaRPr lang="en-US" dirty="0"/>
           </a:p>
@@ -3179,19 +4200,58 @@
           <a:p>
             <a:r>
               <a:rPr lang="en-US" dirty="0" smtClean="0"/>
-              <a:t>Precise definitions</a:t>
-            </a:r>
-          </a:p>
-          <a:p>
+              <a:t>Is it feasible to detect the position and speed of a uncooperative target inside a building using signals from an existing </a:t>
+            </a:r>
+            <a:r>
+              <a:rPr lang="en-US" dirty="0" err="1" smtClean="0"/>
+              <a:t>WiFi</a:t>
+            </a:r>
             <a:r>
               <a:rPr lang="en-US" dirty="0" smtClean="0"/>
-              <a:t>Formulas/mathematical models</a:t>
+              <a:t> network?</a:t>
             </a:r>
           </a:p>
           <a:p>
             <a:r>
               <a:rPr lang="en-US" dirty="0" smtClean="0"/>
-              <a:t>Specific goal</a:t>
+              <a:t>Assumptions:</a:t>
+            </a:r>
+          </a:p>
+          <a:p>
+            <a:pPr lvl="1"/>
+            <a:r>
+              <a:rPr lang="en-US" dirty="0" smtClean="0"/>
+              <a:t>Transmitter (</a:t>
+            </a:r>
+            <a:r>
+              <a:rPr lang="en-US" dirty="0" err="1" smtClean="0"/>
+              <a:t>WiFi</a:t>
+            </a:r>
+            <a:r>
+              <a:rPr lang="en-US" dirty="0" smtClean="0"/>
+              <a:t> router) position known</a:t>
+            </a:r>
+          </a:p>
+          <a:p>
+            <a:pPr lvl="1"/>
+            <a:r>
+              <a:rPr lang="en-US" dirty="0" smtClean="0"/>
+              <a:t>Transmitter using 802.11g based on OFDM at 2.4GHz</a:t>
+            </a:r>
+          </a:p>
+          <a:p>
+            <a:r>
+              <a:rPr lang="en-US" dirty="0" smtClean="0"/>
+              <a:t>Main idea: apply radar techniques and understanding of wireless communication protocols </a:t>
+            </a:r>
+          </a:p>
+          <a:p>
+            <a:endParaRPr lang="en-US" dirty="0"/>
+          </a:p>
+          <a:p>
+            <a:r>
+              <a:rPr lang="en-US" dirty="0" smtClean="0"/>
+              <a:t>TODO radar formulas</a:t>
             </a:r>
             <a:endParaRPr lang="en-US" dirty="0"/>
           </a:p>
@@ -3244,41 +4304,163 @@
           <a:p>
             <a:r>
               <a:rPr lang="en-US" dirty="0" smtClean="0"/>
-              <a:t>Approach (3 minutes)</a:t>
+              <a:t>Approach</a:t>
             </a:r>
             <a:endParaRPr lang="en-US" dirty="0"/>
           </a:p>
         </p:txBody>
       </p:sp>
-      <p:sp>
-        <p:nvSpPr>
-          <p:cNvPr id="3" name="Content Placeholder 2"/>
-          <p:cNvSpPr>
-            <a:spLocks noGrp="1"/>
-          </p:cNvSpPr>
-          <p:nvPr>
-            <p:ph idx="1"/>
-          </p:nvPr>
-        </p:nvSpPr>
-        <p:spPr/>
-        <p:txBody>
-          <a:bodyPr/>
-          <a:lstStyle/>
-          <a:p>
-            <a:r>
-              <a:rPr lang="en-US" dirty="0" smtClean="0"/>
-              <a:t>Main ideas used to tackle the problem</a:t>
-            </a:r>
-          </a:p>
-          <a:p>
-            <a:r>
-              <a:rPr lang="en-US" dirty="0" smtClean="0"/>
-              <a:t>Key equations</a:t>
-            </a:r>
-            <a:endParaRPr lang="en-US" dirty="0"/>
-          </a:p>
-        </p:txBody>
-      </p:sp>
+      <mc:AlternateContent xmlns:mc="http://schemas.openxmlformats.org/markup-compatibility/2006">
+        <mc:Choice xmlns:a14="http://schemas.microsoft.com/office/drawing/2010/main" Requires="a14">
+          <p:sp>
+            <p:nvSpPr>
+              <p:cNvPr id="3" name="Content Placeholder 2"/>
+              <p:cNvSpPr>
+                <a:spLocks noGrp="1"/>
+              </p:cNvSpPr>
+              <p:nvPr>
+                <p:ph idx="1"/>
+              </p:nvPr>
+            </p:nvSpPr>
+            <p:spPr/>
+            <p:txBody>
+              <a:bodyPr/>
+              <a:lstStyle/>
+              <a:p>
+                <a:r>
+                  <a:rPr lang="en-US" dirty="0" smtClean="0"/>
+                  <a:t>Develop a simulation of indoor fading with walls and a moving target</a:t>
+                </a:r>
+              </a:p>
+              <a:p>
+                <a:pPr lvl="1"/>
+                <a:r>
+                  <a:rPr lang="en-US" dirty="0" smtClean="0"/>
+                  <a:t>Receiver sees not only the transmissions from the router but also reflections of the moving target</a:t>
+                </a:r>
+              </a:p>
+              <a:p>
+                <a:pPr lvl="1"/>
+                <a:r>
+                  <a:rPr lang="en-US" dirty="0" smtClean="0"/>
+                  <a:t>How does the channel </a:t>
+                </a:r>
+                <a14:m>
+                  <m:oMath xmlns:m="http://schemas.openxmlformats.org/officeDocument/2006/math">
+                    <m:sSub>
+                      <m:sSubPr>
+                        <m:ctrlPr>
+                          <a:rPr lang="en-US" b="0" i="1" smtClean="0">
+                            <a:latin typeface="Cambria Math" panose="02040503050406030204" pitchFamily="18" charset="0"/>
+                          </a:rPr>
+                        </m:ctrlPr>
+                      </m:sSubPr>
+                      <m:e>
+                        <m:r>
+                          <a:rPr lang="en-US" b="0" i="1" smtClean="0">
+                            <a:latin typeface="Cambria Math" panose="02040503050406030204" pitchFamily="18" charset="0"/>
+                          </a:rPr>
+                          <m:t>h</m:t>
+                        </m:r>
+                      </m:e>
+                      <m:sub>
+                        <m:r>
+                          <a:rPr lang="en-US" b="0" i="1" smtClean="0">
+                            <a:latin typeface="Cambria Math" panose="02040503050406030204" pitchFamily="18" charset="0"/>
+                          </a:rPr>
+                          <m:t>𝑙</m:t>
+                        </m:r>
+                      </m:sub>
+                    </m:sSub>
+                    <m:d>
+                      <m:dPr>
+                        <m:begChr m:val="["/>
+                        <m:endChr m:val="]"/>
+                        <m:ctrlPr>
+                          <a:rPr lang="en-US" b="0" i="1" smtClean="0">
+                            <a:latin typeface="Cambria Math" panose="02040503050406030204" pitchFamily="18" charset="0"/>
+                          </a:rPr>
+                        </m:ctrlPr>
+                      </m:dPr>
+                      <m:e>
+                        <m:r>
+                          <a:rPr lang="en-US" b="0" i="1" smtClean="0">
+                            <a:latin typeface="Cambria Math" panose="02040503050406030204" pitchFamily="18" charset="0"/>
+                          </a:rPr>
+                          <m:t>𝑚</m:t>
+                        </m:r>
+                      </m:e>
+                    </m:d>
+                  </m:oMath>
+                </a14:m>
+                <a:r>
+                  <a:rPr lang="en-US" dirty="0" smtClean="0"/>
+                  <a:t> change as the target moves?</a:t>
+                </a:r>
+              </a:p>
+              <a:p>
+                <a:pPr lvl="1"/>
+                <a:r>
+                  <a:rPr lang="en-US" dirty="0" smtClean="0"/>
+                  <a:t>TODO more mathematical description</a:t>
+                </a:r>
+              </a:p>
+              <a:p>
+                <a:pPr lvl="1"/>
+                <a:endParaRPr lang="en-US" dirty="0" smtClean="0"/>
+              </a:p>
+              <a:p>
+                <a:r>
+                  <a:rPr lang="en-US" dirty="0" smtClean="0"/>
+                  <a:t>Simulate OFDM transmissions over the channel </a:t>
+                </a:r>
+              </a:p>
+              <a:p>
+                <a:endParaRPr lang="en-US" dirty="0"/>
+              </a:p>
+              <a:p>
+                <a:r>
+                  <a:rPr lang="en-US" dirty="0" smtClean="0"/>
+                  <a:t>Use radar techniques to correlate transmitted and received signal</a:t>
+                </a:r>
+              </a:p>
+            </p:txBody>
+          </p:sp>
+        </mc:Choice>
+        <mc:Fallback>
+          <p:sp>
+            <p:nvSpPr>
+              <p:cNvPr id="3" name="Content Placeholder 2"/>
+              <p:cNvSpPr>
+                <a:spLocks noGrp="1" noRot="1" noChangeAspect="1" noMove="1" noResize="1" noEditPoints="1" noAdjustHandles="1" noChangeArrowheads="1" noChangeShapeType="1" noTextEdit="1"/>
+              </p:cNvSpPr>
+              <p:nvPr>
+                <p:ph idx="1"/>
+              </p:nvPr>
+            </p:nvSpPr>
+            <p:spPr>
+              <a:blipFill rotWithShape="0">
+                <a:blip r:embed="rId3"/>
+                <a:stretch>
+                  <a:fillRect l="-1043" t="-2241"/>
+                </a:stretch>
+              </a:blipFill>
+            </p:spPr>
+            <p:txBody>
+              <a:bodyPr/>
+              <a:lstStyle/>
+              <a:p>
+                <a:r>
+                  <a:rPr lang="en-US">
+                    <a:noFill/>
+                  </a:rPr>
+                  <a:t> </a:t>
+                </a:r>
+              </a:p>
+            </p:txBody>
+          </p:sp>
+        </mc:Fallback>
+      </mc:AlternateContent>
     </p:spTree>
     <p:extLst>
       <p:ext uri="{BB962C8B-B14F-4D97-AF65-F5344CB8AC3E}">
@@ -3326,57 +4508,171 @@
           <a:p>
             <a:r>
               <a:rPr lang="en-US" dirty="0" smtClean="0"/>
-              <a:t>Simulations (3 minutes)</a:t>
+              <a:t>Simulating the Indoor Channel</a:t>
             </a:r>
             <a:endParaRPr lang="en-US" dirty="0"/>
           </a:p>
         </p:txBody>
       </p:sp>
-      <p:sp>
-        <p:nvSpPr>
-          <p:cNvPr id="3" name="Content Placeholder 2"/>
-          <p:cNvSpPr>
-            <a:spLocks noGrp="1"/>
-          </p:cNvSpPr>
-          <p:nvPr>
-            <p:ph idx="1"/>
-          </p:nvPr>
-        </p:nvSpPr>
-        <p:spPr/>
-        <p:txBody>
-          <a:bodyPr/>
-          <a:lstStyle/>
-          <a:p>
-            <a:r>
-              <a:rPr lang="en-US" dirty="0" smtClean="0"/>
-              <a:t>Why were these simulations chosen?</a:t>
-            </a:r>
-          </a:p>
-          <a:p>
-            <a:r>
-              <a:rPr lang="en-US" dirty="0" smtClean="0"/>
-              <a:t>Clear descriptions of parameter choices</a:t>
-            </a:r>
-          </a:p>
-          <a:p>
-            <a:r>
-              <a:rPr lang="en-US" dirty="0" smtClean="0"/>
-              <a:t>Discuss what the plots mean</a:t>
-            </a:r>
-          </a:p>
-          <a:p>
-            <a:r>
-              <a:rPr lang="en-US" dirty="0" smtClean="0"/>
-              <a:t>Do the plots match the papers? If not, why?</a:t>
-            </a:r>
-            <a:endParaRPr lang="en-US" dirty="0"/>
-          </a:p>
-        </p:txBody>
-      </p:sp>
+      <mc:AlternateContent xmlns:mc="http://schemas.openxmlformats.org/markup-compatibility/2006">
+        <mc:Choice xmlns:a14="http://schemas.microsoft.com/office/drawing/2010/main" Requires="a14">
+          <p:sp>
+            <p:nvSpPr>
+              <p:cNvPr id="3" name="Content Placeholder 2"/>
+              <p:cNvSpPr>
+                <a:spLocks noGrp="1"/>
+              </p:cNvSpPr>
+              <p:nvPr>
+                <p:ph idx="1"/>
+              </p:nvPr>
+            </p:nvSpPr>
+            <p:spPr/>
+            <p:txBody>
+              <a:bodyPr/>
+              <a:lstStyle/>
+              <a:p>
+                <a:r>
+                  <a:rPr lang="en-US" dirty="0" smtClean="0"/>
+                  <a:t>Develop a ray tracing simulation to estimate the impulse response</a:t>
+                </a:r>
+              </a:p>
+              <a:p>
+                <a:r>
+                  <a:rPr lang="en-US" dirty="0" smtClean="0"/>
+                  <a:t>Simplifications:</a:t>
+                </a:r>
+              </a:p>
+              <a:p>
+                <a:pPr lvl="1"/>
+                <a:r>
+                  <a:rPr lang="en-US" dirty="0" smtClean="0"/>
+                  <a:t>Consider single floor building with no reflection from ceiling or floor</a:t>
+                </a:r>
+              </a:p>
+              <a:p>
+                <a:pPr lvl="1"/>
+                <a:r>
+                  <a:rPr lang="en-US" dirty="0" smtClean="0"/>
+                  <a:t>Walls both reflect some energy and transmit some energy</a:t>
+                </a:r>
+              </a:p>
+              <a:p>
+                <a:pPr lvl="1"/>
+                <a:r>
+                  <a:rPr lang="en-US" dirty="0" smtClean="0"/>
+                  <a:t>A moving target also reflects and transmits some energy</a:t>
+                </a:r>
+              </a:p>
+              <a:p>
+                <a:r>
+                  <a:rPr lang="en-US" dirty="0" smtClean="0"/>
+                  <a:t>Techniques based on “A graphical indoor radio channel simulator using 2D ray tracing” by Holt and </a:t>
+                </a:r>
+                <a:r>
+                  <a:rPr lang="en-US" dirty="0" err="1" smtClean="0"/>
+                  <a:t>Pahlavan</a:t>
+                </a:r>
+                <a:endParaRPr lang="en-US" dirty="0" smtClean="0"/>
+              </a:p>
+              <a:p>
+                <a:r>
+                  <a:rPr lang="en-US" dirty="0" smtClean="0"/>
+                  <a:t>Intuition: As distance to target changes, the subset of taps </a:t>
+                </a:r>
+                <a14:m>
+                  <m:oMath xmlns:m="http://schemas.openxmlformats.org/officeDocument/2006/math">
+                    <m:sSub>
+                      <m:sSubPr>
+                        <m:ctrlPr>
+                          <a:rPr lang="en-US" b="0" i="1" smtClean="0">
+                            <a:latin typeface="Cambria Math" panose="02040503050406030204" pitchFamily="18" charset="0"/>
+                          </a:rPr>
+                        </m:ctrlPr>
+                      </m:sSubPr>
+                      <m:e>
+                        <m:r>
+                          <a:rPr lang="en-US" b="0" i="1" smtClean="0">
+                            <a:latin typeface="Cambria Math" panose="02040503050406030204" pitchFamily="18" charset="0"/>
+                          </a:rPr>
+                          <m:t>h</m:t>
+                        </m:r>
+                      </m:e>
+                      <m:sub>
+                        <m:r>
+                          <a:rPr lang="en-US" b="0" i="1" smtClean="0">
+                            <a:latin typeface="Cambria Math" panose="02040503050406030204" pitchFamily="18" charset="0"/>
+                          </a:rPr>
+                          <m:t>𝑙</m:t>
+                        </m:r>
+                      </m:sub>
+                    </m:sSub>
+                    <m:d>
+                      <m:dPr>
+                        <m:begChr m:val="["/>
+                        <m:endChr m:val="]"/>
+                        <m:ctrlPr>
+                          <a:rPr lang="en-US" b="0" i="1" smtClean="0">
+                            <a:latin typeface="Cambria Math" panose="02040503050406030204" pitchFamily="18" charset="0"/>
+                          </a:rPr>
+                        </m:ctrlPr>
+                      </m:dPr>
+                      <m:e>
+                        <m:r>
+                          <a:rPr lang="en-US" b="0" i="1" smtClean="0">
+                            <a:latin typeface="Cambria Math" panose="02040503050406030204" pitchFamily="18" charset="0"/>
+                          </a:rPr>
+                          <m:t>𝑚</m:t>
+                        </m:r>
+                      </m:e>
+                    </m:d>
+                  </m:oMath>
+                </a14:m>
+                <a:r>
+                  <a:rPr lang="en-US" dirty="0" smtClean="0"/>
+                  <a:t> from reflections of target will shift</a:t>
+                </a:r>
+              </a:p>
+            </p:txBody>
+          </p:sp>
+        </mc:Choice>
+        <mc:Fallback>
+          <p:sp>
+            <p:nvSpPr>
+              <p:cNvPr id="3" name="Content Placeholder 2"/>
+              <p:cNvSpPr>
+                <a:spLocks noGrp="1" noRot="1" noChangeAspect="1" noMove="1" noResize="1" noEditPoints="1" noAdjustHandles="1" noChangeArrowheads="1" noChangeShapeType="1" noTextEdit="1"/>
+              </p:cNvSpPr>
+              <p:nvPr>
+                <p:ph idx="1"/>
+              </p:nvPr>
+            </p:nvSpPr>
+            <p:spPr>
+              <a:blipFill rotWithShape="0">
+                <a:blip r:embed="rId3"/>
+                <a:stretch>
+                  <a:fillRect l="-1043" t="-2241" r="-1855"/>
+                </a:stretch>
+              </a:blipFill>
+            </p:spPr>
+            <p:txBody>
+              <a:bodyPr/>
+              <a:lstStyle/>
+              <a:p>
+                <a:r>
+                  <a:rPr lang="en-US">
+                    <a:noFill/>
+                  </a:rPr>
+                  <a:t> </a:t>
+                </a:r>
+              </a:p>
+            </p:txBody>
+          </p:sp>
+        </mc:Fallback>
+      </mc:AlternateContent>
     </p:spTree>
     <p:extLst>
       <p:ext uri="{BB962C8B-B14F-4D97-AF65-F5344CB8AC3E}">
-        <p14:creationId xmlns:p14="http://schemas.microsoft.com/office/powerpoint/2010/main" val="199467413"/>
+        <p14:creationId xmlns:p14="http://schemas.microsoft.com/office/powerpoint/2010/main" val="3164094560"/>
       </p:ext>
     </p:extLst>
   </p:cSld>
@@ -3420,7 +4716,159 @@
           <a:p>
             <a:r>
               <a:rPr lang="en-US" dirty="0" smtClean="0"/>
-              <a:t>Conclusion (1 minute)</a:t>
+              <a:t>Simulating the Indoor Channel</a:t>
+            </a:r>
+            <a:endParaRPr lang="en-US" dirty="0"/>
+          </a:p>
+        </p:txBody>
+      </p:sp>
+      <p:sp>
+        <p:nvSpPr>
+          <p:cNvPr id="3" name="Content Placeholder 2"/>
+          <p:cNvSpPr>
+            <a:spLocks noGrp="1"/>
+          </p:cNvSpPr>
+          <p:nvPr>
+            <p:ph idx="1"/>
+          </p:nvPr>
+        </p:nvSpPr>
+        <p:spPr/>
+        <p:txBody>
+          <a:bodyPr/>
+          <a:lstStyle/>
+          <a:p>
+            <a:r>
+              <a:rPr lang="en-US" dirty="0" smtClean="0"/>
+              <a:t>TODO pictures</a:t>
+            </a:r>
+            <a:endParaRPr lang="en-US" dirty="0"/>
+          </a:p>
+        </p:txBody>
+      </p:sp>
+    </p:spTree>
+    <p:extLst>
+      <p:ext uri="{BB962C8B-B14F-4D97-AF65-F5344CB8AC3E}">
+        <p14:creationId xmlns:p14="http://schemas.microsoft.com/office/powerpoint/2010/main" val="1602356833"/>
+      </p:ext>
+    </p:extLst>
+  </p:cSld>
+  <p:clrMapOvr>
+    <a:masterClrMapping/>
+  </p:clrMapOvr>
+</p:sld>
+</file>
+
+<file path=ppt/slides/slide7.xml><?xml version="1.0" encoding="utf-8"?>
+<p:sld xmlns:a="http://schemas.openxmlformats.org/drawingml/2006/main" xmlns:r="http://schemas.openxmlformats.org/officeDocument/2006/relationships" xmlns:p="http://schemas.openxmlformats.org/presentationml/2006/main">
+  <p:cSld>
+    <p:spTree>
+      <p:nvGrpSpPr>
+        <p:cNvPr id="1" name=""/>
+        <p:cNvGrpSpPr/>
+        <p:nvPr/>
+      </p:nvGrpSpPr>
+      <p:grpSpPr>
+        <a:xfrm>
+          <a:off x="0" y="0"/>
+          <a:ext cx="0" cy="0"/>
+          <a:chOff x="0" y="0"/>
+          <a:chExt cx="0" cy="0"/>
+        </a:xfrm>
+      </p:grpSpPr>
+      <p:sp>
+        <p:nvSpPr>
+          <p:cNvPr id="2" name="Title 1"/>
+          <p:cNvSpPr>
+            <a:spLocks noGrp="1"/>
+          </p:cNvSpPr>
+          <p:nvPr>
+            <p:ph type="title"/>
+          </p:nvPr>
+        </p:nvSpPr>
+        <p:spPr/>
+        <p:txBody>
+          <a:bodyPr/>
+          <a:lstStyle/>
+          <a:p>
+            <a:r>
+              <a:rPr lang="en-US" dirty="0" smtClean="0"/>
+              <a:t>Radar Stuff</a:t>
+            </a:r>
+            <a:endParaRPr lang="en-US" dirty="0"/>
+          </a:p>
+        </p:txBody>
+      </p:sp>
+      <p:sp>
+        <p:nvSpPr>
+          <p:cNvPr id="3" name="Content Placeholder 2"/>
+          <p:cNvSpPr>
+            <a:spLocks noGrp="1"/>
+          </p:cNvSpPr>
+          <p:nvPr>
+            <p:ph idx="1"/>
+          </p:nvPr>
+        </p:nvSpPr>
+        <p:spPr/>
+        <p:txBody>
+          <a:bodyPr/>
+          <a:lstStyle/>
+          <a:p>
+            <a:r>
+              <a:rPr lang="en-US" dirty="0" smtClean="0"/>
+              <a:t>TODO</a:t>
+            </a:r>
+            <a:endParaRPr lang="en-US" dirty="0"/>
+          </a:p>
+        </p:txBody>
+      </p:sp>
+    </p:spTree>
+    <p:extLst>
+      <p:ext uri="{BB962C8B-B14F-4D97-AF65-F5344CB8AC3E}">
+        <p14:creationId xmlns:p14="http://schemas.microsoft.com/office/powerpoint/2010/main" val="284725016"/>
+      </p:ext>
+    </p:extLst>
+  </p:cSld>
+  <p:clrMapOvr>
+    <a:masterClrMapping/>
+  </p:clrMapOvr>
+</p:sld>
+</file>
+
+<file path=ppt/slides/slide8.xml><?xml version="1.0" encoding="utf-8"?>
+<p:sld xmlns:a="http://schemas.openxmlformats.org/drawingml/2006/main" xmlns:r="http://schemas.openxmlformats.org/officeDocument/2006/relationships" xmlns:p="http://schemas.openxmlformats.org/presentationml/2006/main">
+  <p:cSld>
+    <p:spTree>
+      <p:nvGrpSpPr>
+        <p:cNvPr id="1" name=""/>
+        <p:cNvGrpSpPr/>
+        <p:nvPr/>
+      </p:nvGrpSpPr>
+      <p:grpSpPr>
+        <a:xfrm>
+          <a:off x="0" y="0"/>
+          <a:ext cx="0" cy="0"/>
+          <a:chOff x="0" y="0"/>
+          <a:chExt cx="0" cy="0"/>
+        </a:xfrm>
+      </p:grpSpPr>
+      <p:sp>
+        <p:nvSpPr>
+          <p:cNvPr id="2" name="Title 1"/>
+          <p:cNvSpPr>
+            <a:spLocks noGrp="1"/>
+          </p:cNvSpPr>
+          <p:nvPr>
+            <p:ph type="title"/>
+          </p:nvPr>
+        </p:nvSpPr>
+        <p:spPr/>
+        <p:txBody>
+          <a:bodyPr/>
+          <a:lstStyle/>
+          <a:p>
+            <a:r>
+              <a:rPr lang="en-US" dirty="0" smtClean="0"/>
+              <a:t>Conclusion</a:t>
             </a:r>
             <a:endParaRPr lang="en-US" dirty="0"/>
           </a:p>
@@ -3717,4 +5165,265 @@
     </a:ext>
   </a:extLst>
 </a:theme>
+</file>
+
+<file path=ppt/theme/theme2.xml><?xml version="1.0" encoding="utf-8"?>
+<a:theme xmlns:a="http://schemas.openxmlformats.org/drawingml/2006/main" name="Office Theme">
+  <a:themeElements>
+    <a:clrScheme name="Office">
+      <a:dk1>
+        <a:sysClr val="windowText" lastClr="000000"/>
+      </a:dk1>
+      <a:lt1>
+        <a:sysClr val="window" lastClr="FFFFFF"/>
+      </a:lt1>
+      <a:dk2>
+        <a:srgbClr val="44546A"/>
+      </a:dk2>
+      <a:lt2>
+        <a:srgbClr val="E7E6E6"/>
+      </a:lt2>
+      <a:accent1>
+        <a:srgbClr val="5B9BD5"/>
+      </a:accent1>
+      <a:accent2>
+        <a:srgbClr val="ED7D31"/>
+      </a:accent2>
+      <a:accent3>
+        <a:srgbClr val="A5A5A5"/>
+      </a:accent3>
+      <a:accent4>
+        <a:srgbClr val="FFC000"/>
+      </a:accent4>
+      <a:accent5>
+        <a:srgbClr val="4472C4"/>
+      </a:accent5>
+      <a:accent6>
+        <a:srgbClr val="70AD47"/>
+      </a:accent6>
+      <a:hlink>
+        <a:srgbClr val="0563C1"/>
+      </a:hlink>
+      <a:folHlink>
+        <a:srgbClr val="954F72"/>
+      </a:folHlink>
+    </a:clrScheme>
+    <a:fontScheme name="Office">
+      <a:majorFont>
+        <a:latin typeface="Calibri Light" panose="020F0302020204030204"/>
+        <a:ea typeface=""/>
+        <a:cs typeface=""/>
+        <a:font script="Jpan" typeface="ＭＳ Ｐゴシック"/>
+        <a:font script="Hang" typeface="맑은 고딕"/>
+        <a:font script="Hans" typeface="宋体"/>
+        <a:font script="Hant" typeface="新細明體"/>
+        <a:font script="Arab" typeface="Times New Roman"/>
+        <a:font script="Hebr" typeface="Times New Roman"/>
+        <a:font script="Thai" typeface="Angsana New"/>
+        <a:font script="Ethi" typeface="Nyala"/>
+        <a:font script="Beng" typeface="Vrinda"/>
+        <a:font script="Gujr" typeface="Shruti"/>
+        <a:font script="Khmr" typeface="MoolBoran"/>
+        <a:font script="Knda" typeface="Tunga"/>
+        <a:font script="Guru" typeface="Raavi"/>
+        <a:font script="Cans" typeface="Euphemia"/>
+        <a:font script="Cher" typeface="Plantagenet Cherokee"/>
+        <a:font script="Yiii" typeface="Microsoft Yi Baiti"/>
+        <a:font script="Tibt" typeface="Microsoft Himalaya"/>
+        <a:font script="Thaa" typeface="MV Boli"/>
+        <a:font script="Deva" typeface="Mangal"/>
+        <a:font script="Telu" typeface="Gautami"/>
+        <a:font script="Taml" typeface="Latha"/>
+        <a:font script="Syrc" typeface="Estrangelo Edessa"/>
+        <a:font script="Orya" typeface="Kalinga"/>
+        <a:font script="Mlym" typeface="Kartika"/>
+        <a:font script="Laoo" typeface="DokChampa"/>
+        <a:font script="Sinh" typeface="Iskoola Pota"/>
+        <a:font script="Mong" typeface="Mongolian Baiti"/>
+        <a:font script="Viet" typeface="Times New Roman"/>
+        <a:font script="Uigh" typeface="Microsoft Uighur"/>
+        <a:font script="Geor" typeface="Sylfaen"/>
+      </a:majorFont>
+      <a:minorFont>
+        <a:latin typeface="Calibri" panose="020F0502020204030204"/>
+        <a:ea typeface=""/>
+        <a:cs typeface=""/>
+        <a:font script="Jpan" typeface="ＭＳ Ｐゴシック"/>
+        <a:font script="Hang" typeface="맑은 고딕"/>
+        <a:font script="Hans" typeface="宋体"/>
+        <a:font script="Hant" typeface="新細明體"/>
+        <a:font script="Arab" typeface="Arial"/>
+        <a:font script="Hebr" typeface="Arial"/>
+        <a:font script="Thai" typeface="Cordia New"/>
+        <a:font script="Ethi" typeface="Nyala"/>
+        <a:font script="Beng" typeface="Vrinda"/>
+        <a:font script="Gujr" typeface="Shruti"/>
+        <a:font script="Khmr" typeface="DaunPenh"/>
+        <a:font script="Knda" typeface="Tunga"/>
+        <a:font script="Guru" typeface="Raavi"/>
+        <a:font script="Cans" typeface="Euphemia"/>
+        <a:font script="Cher" typeface="Plantagenet Cherokee"/>
+        <a:font script="Yiii" typeface="Microsoft Yi Baiti"/>
+        <a:font script="Tibt" typeface="Microsoft Himalaya"/>
+        <a:font script="Thaa" typeface="MV Boli"/>
+        <a:font script="Deva" typeface="Mangal"/>
+        <a:font script="Telu" typeface="Gautami"/>
+        <a:font script="Taml" typeface="Latha"/>
+        <a:font script="Syrc" typeface="Estrangelo Edessa"/>
+        <a:font script="Orya" typeface="Kalinga"/>
+        <a:font script="Mlym" typeface="Kartika"/>
+        <a:font script="Laoo" typeface="DokChampa"/>
+        <a:font script="Sinh" typeface="Iskoola Pota"/>
+        <a:font script="Mong" typeface="Mongolian Baiti"/>
+        <a:font script="Viet" typeface="Arial"/>
+        <a:font script="Uigh" typeface="Microsoft Uighur"/>
+        <a:font script="Geor" typeface="Sylfaen"/>
+      </a:minorFont>
+    </a:fontScheme>
+    <a:fmtScheme name="Office">
+      <a:fillStyleLst>
+        <a:solidFill>
+          <a:schemeClr val="phClr"/>
+        </a:solidFill>
+        <a:gradFill rotWithShape="1">
+          <a:gsLst>
+            <a:gs pos="0">
+              <a:schemeClr val="phClr">
+                <a:lumMod val="110000"/>
+                <a:satMod val="105000"/>
+                <a:tint val="67000"/>
+              </a:schemeClr>
+            </a:gs>
+            <a:gs pos="50000">
+              <a:schemeClr val="phClr">
+                <a:lumMod val="105000"/>
+                <a:satMod val="103000"/>
+                <a:tint val="73000"/>
+              </a:schemeClr>
+            </a:gs>
+            <a:gs pos="100000">
+              <a:schemeClr val="phClr">
+                <a:lumMod val="105000"/>
+                <a:satMod val="109000"/>
+                <a:tint val="81000"/>
+              </a:schemeClr>
+            </a:gs>
+          </a:gsLst>
+          <a:lin ang="5400000" scaled="0"/>
+        </a:gradFill>
+        <a:gradFill rotWithShape="1">
+          <a:gsLst>
+            <a:gs pos="0">
+              <a:schemeClr val="phClr">
+                <a:satMod val="103000"/>
+                <a:lumMod val="102000"/>
+                <a:tint val="94000"/>
+              </a:schemeClr>
+            </a:gs>
+            <a:gs pos="50000">
+              <a:schemeClr val="phClr">
+                <a:satMod val="110000"/>
+                <a:lumMod val="100000"/>
+                <a:shade val="100000"/>
+              </a:schemeClr>
+            </a:gs>
+            <a:gs pos="100000">
+              <a:schemeClr val="phClr">
+                <a:lumMod val="99000"/>
+                <a:satMod val="120000"/>
+                <a:shade val="78000"/>
+              </a:schemeClr>
+            </a:gs>
+          </a:gsLst>
+          <a:lin ang="5400000" scaled="0"/>
+        </a:gradFill>
+      </a:fillStyleLst>
+      <a:lnStyleLst>
+        <a:ln w="6350" cap="flat" cmpd="sng" algn="ctr">
+          <a:solidFill>
+            <a:schemeClr val="phClr"/>
+          </a:solidFill>
+          <a:prstDash val="solid"/>
+          <a:miter lim="800000"/>
+        </a:ln>
+        <a:ln w="12700" cap="flat" cmpd="sng" algn="ctr">
+          <a:solidFill>
+            <a:schemeClr val="phClr"/>
+          </a:solidFill>
+          <a:prstDash val="solid"/>
+          <a:miter lim="800000"/>
+        </a:ln>
+        <a:ln w="19050" cap="flat" cmpd="sng" algn="ctr">
+          <a:solidFill>
+            <a:schemeClr val="phClr"/>
+          </a:solidFill>
+          <a:prstDash val="solid"/>
+          <a:miter lim="800000"/>
+        </a:ln>
+      </a:lnStyleLst>
+      <a:effectStyleLst>
+        <a:effectStyle>
+          <a:effectLst/>
+        </a:effectStyle>
+        <a:effectStyle>
+          <a:effectLst/>
+        </a:effectStyle>
+        <a:effectStyle>
+          <a:effectLst>
+            <a:outerShdw blurRad="57150" dist="19050" dir="5400000" algn="ctr" rotWithShape="0">
+              <a:srgbClr val="000000">
+                <a:alpha val="63000"/>
+              </a:srgbClr>
+            </a:outerShdw>
+          </a:effectLst>
+        </a:effectStyle>
+      </a:effectStyleLst>
+      <a:bgFillStyleLst>
+        <a:solidFill>
+          <a:schemeClr val="phClr"/>
+        </a:solidFill>
+        <a:solidFill>
+          <a:schemeClr val="phClr">
+            <a:tint val="95000"/>
+            <a:satMod val="170000"/>
+          </a:schemeClr>
+        </a:solidFill>
+        <a:gradFill rotWithShape="1">
+          <a:gsLst>
+            <a:gs pos="0">
+              <a:schemeClr val="phClr">
+                <a:tint val="93000"/>
+                <a:satMod val="150000"/>
+                <a:shade val="98000"/>
+                <a:lumMod val="102000"/>
+              </a:schemeClr>
+            </a:gs>
+            <a:gs pos="50000">
+              <a:schemeClr val="phClr">
+                <a:tint val="98000"/>
+                <a:satMod val="130000"/>
+                <a:shade val="90000"/>
+                <a:lumMod val="103000"/>
+              </a:schemeClr>
+            </a:gs>
+            <a:gs pos="100000">
+              <a:schemeClr val="phClr">
+                <a:shade val="63000"/>
+                <a:satMod val="120000"/>
+              </a:schemeClr>
+            </a:gs>
+          </a:gsLst>
+          <a:lin ang="5400000" scaled="0"/>
+        </a:gradFill>
+      </a:bgFillStyleLst>
+    </a:fmtScheme>
+  </a:themeElements>
+  <a:objectDefaults/>
+  <a:extraClrSchemeLst/>
+  <a:extLst>
+    <a:ext uri="{05A4C25C-085E-4340-85A3-A5531E510DB2}">
+      <thm15:themeFamily xmlns:thm15="http://schemas.microsoft.com/office/thememl/2012/main" name="Office Theme" id="{62F939B6-93AF-4DB8-9C6B-D6C7DFDC589F}" vid="{4A3C46E8-61CC-4603-A589-7422A47A8E4A}"/>
+    </a:ext>
+  </a:extLst>
+</a:theme>
 </file>
</xml_diff>

<commit_message>
Final presentation that we used
</commit_message>
<xml_diff>
--- a/presentation.pptx
+++ b/presentation.pptx
@@ -4040,6 +4040,13 @@
   <p:clrMapOvr>
     <a:masterClrMapping/>
   </p:clrMapOvr>
+  <p:timing>
+    <p:tnLst>
+      <p:par>
+        <p:cTn id="1" dur="indefinite" restart="never" nodeType="tmRoot"/>
+      </p:par>
+    </p:tnLst>
+  </p:timing>
 </p:sld>
 </file>
 
@@ -4188,6 +4195,13 @@
   <p:clrMapOvr>
     <a:masterClrMapping/>
   </p:clrMapOvr>
+  <p:timing>
+    <p:tnLst>
+      <p:par>
+        <p:cTn id="1" dur="indefinite" restart="never" nodeType="tmRoot"/>
+      </p:par>
+    </p:tnLst>
+  </p:timing>
 </p:sld>
 </file>
 
@@ -4231,8 +4245,8 @@
           </a:p>
         </p:txBody>
       </p:sp>
-      <mc:AlternateContent xmlns:mc="http://schemas.openxmlformats.org/markup-compatibility/2006" xmlns:a14="http://schemas.microsoft.com/office/drawing/2010/main">
-        <mc:Choice Requires="a14">
+      <mc:AlternateContent xmlns:mc="http://schemas.openxmlformats.org/markup-compatibility/2006">
+        <mc:Choice xmlns:a14="http://schemas.microsoft.com/office/drawing/2010/main" Requires="a14">
           <p:sp>
             <p:nvSpPr>
               <p:cNvPr id="3" name="Content Placeholder 2"/>
@@ -4615,37 +4629,25 @@
                                   </m:ctrlPr>
                                 </m:sSubSupPr>
                                 <m:e>
-                                  <m:sSub>
-                                    <m:sSubPr>
-                                      <m:ctrlPr>
-                                        <a:rPr lang="en-US" sz="2400" b="0" i="1" smtClean="0">
-                                          <a:latin typeface="Cambria Math" panose="02040503050406030204" pitchFamily="18" charset="0"/>
-                                        </a:rPr>
-                                      </m:ctrlPr>
-                                    </m:sSubPr>
-                                    <m:e>
-                                      <m:r>
-                                        <a:rPr lang="en-US" sz="2400" b="0" i="1" smtClean="0">
-                                          <a:latin typeface="Cambria Math"/>
-                                        </a:rPr>
-                                        <m:t>𝑠</m:t>
-                                      </m:r>
-                                    </m:e>
-                                    <m:sub>
-                                      <m:r>
-                                        <a:rPr lang="en-US" sz="2400" b="0" i="1" smtClean="0">
-                                          <a:latin typeface="Cambria Math"/>
-                                        </a:rPr>
-                                        <m:t>𝑟𝑒𝑓</m:t>
-                                      </m:r>
-                                    </m:sub>
-                                  </m:sSub>
+                                  <m:r>
+                                    <a:rPr lang="en-US" sz="2400" b="0" i="1" smtClean="0">
+                                      <a:latin typeface="Cambria Math" panose="02040503050406030204" pitchFamily="18" charset="0"/>
+                                    </a:rPr>
+                                    <m:t>𝑠</m:t>
+                                  </m:r>
                                 </m:e>
-                                <m:sub/>
+                                <m:sub>
+                                  <m:r>
+                                    <a:rPr lang="en-US" sz="2400" b="0" i="1" smtClean="0">
+                                      <a:latin typeface="Cambria Math" panose="02040503050406030204" pitchFamily="18" charset="0"/>
+                                    </a:rPr>
+                                    <m:t>𝑟𝑒𝑓</m:t>
+                                  </m:r>
+                                </m:sub>
                                 <m:sup>
                                   <m:r>
                                     <a:rPr lang="en-US" sz="2400" b="0" i="1" smtClean="0">
-                                      <a:latin typeface="Cambria Math"/>
+                                      <a:latin typeface="Cambria Math" panose="02040503050406030204" pitchFamily="18" charset="0"/>
                                     </a:rPr>
                                     <m:t>∗</m:t>
                                   </m:r>
@@ -4770,7 +4772,7 @@
             </p:txBody>
           </p:sp>
         </mc:Choice>
-        <mc:Fallback xmlns="">
+        <mc:Fallback>
           <p:sp>
             <p:nvSpPr>
               <p:cNvPr id="3" name="Content Placeholder 2"/>
@@ -4786,10 +4788,10 @@
                 <a:off x="609600" y="1600200"/>
                 <a:ext cx="10972800" cy="4876800"/>
               </a:xfrm>
-              <a:blipFill rotWithShape="1">
+              <a:blipFill rotWithShape="0">
                 <a:blip r:embed="rId2"/>
                 <a:stretch>
-                  <a:fillRect l="-944" t="-2750"/>
+                  <a:fillRect l="-1000" t="-2875"/>
                 </a:stretch>
               </a:blipFill>
             </p:spPr>
@@ -4818,6 +4820,13 @@
   <p:clrMapOvr>
     <a:masterClrMapping/>
   </p:clrMapOvr>
+  <p:timing>
+    <p:tnLst>
+      <p:par>
+        <p:cTn id="1" dur="indefinite" restart="never" nodeType="tmRoot"/>
+      </p:par>
+    </p:tnLst>
+  </p:timing>
 </p:sld>
 </file>
 
@@ -5244,6 +5253,13 @@
   <p:clrMapOvr>
     <a:masterClrMapping/>
   </p:clrMapOvr>
+  <p:timing>
+    <p:tnLst>
+      <p:par>
+        <p:cTn id="1" dur="indefinite" restart="never" nodeType="tmRoot"/>
+      </p:par>
+    </p:tnLst>
+  </p:timing>
 </p:sld>
 </file>
 
@@ -5391,6 +5407,13 @@
   <p:clrMapOvr>
     <a:masterClrMapping/>
   </p:clrMapOvr>
+  <p:timing>
+    <p:tnLst>
+      <p:par>
+        <p:cTn id="1" dur="indefinite" restart="never" nodeType="tmRoot"/>
+      </p:par>
+    </p:tnLst>
+  </p:timing>
 </p:sld>
 </file>
 
@@ -5528,6 +5551,13 @@
   <p:clrMapOvr>
     <a:masterClrMapping/>
   </p:clrMapOvr>
+  <p:timing>
+    <p:tnLst>
+      <p:par>
+        <p:cTn id="1" dur="indefinite" restart="never" nodeType="tmRoot"/>
+      </p:par>
+    </p:tnLst>
+  </p:timing>
 </p:sld>
 </file>
 
@@ -5654,6 +5684,13 @@
   <p:clrMapOvr>
     <a:masterClrMapping/>
   </p:clrMapOvr>
+  <p:timing>
+    <p:tnLst>
+      <p:par>
+        <p:cTn id="1" dur="indefinite" restart="never" nodeType="tmRoot"/>
+      </p:par>
+    </p:tnLst>
+  </p:timing>
 </p:sld>
 </file>
 
@@ -5777,6 +5814,13 @@
   <p:clrMapOvr>
     <a:masterClrMapping/>
   </p:clrMapOvr>
+  <p:timing>
+    <p:tnLst>
+      <p:par>
+        <p:cTn id="1" dur="indefinite" restart="never" nodeType="tmRoot"/>
+      </p:par>
+    </p:tnLst>
+  </p:timing>
 </p:sld>
 </file>
 
@@ -5904,6 +5948,13 @@
   <p:clrMapOvr>
     <a:masterClrMapping/>
   </p:clrMapOvr>
+  <p:timing>
+    <p:tnLst>
+      <p:par>
+        <p:cTn id="1" dur="indefinite" restart="never" nodeType="tmRoot"/>
+      </p:par>
+    </p:tnLst>
+  </p:timing>
 </p:sld>
 </file>
 
@@ -6350,6 +6401,13 @@
   <p:clrMapOvr>
     <a:masterClrMapping/>
   </p:clrMapOvr>
+  <p:timing>
+    <p:tnLst>
+      <p:par>
+        <p:cTn id="1" dur="indefinite" restart="never" nodeType="tmRoot"/>
+      </p:par>
+    </p:tnLst>
+  </p:timing>
 </p:sld>
 </file>
 
@@ -6645,6 +6703,13 @@
   <p:clrMapOvr>
     <a:masterClrMapping/>
   </p:clrMapOvr>
+  <p:timing>
+    <p:tnLst>
+      <p:par>
+        <p:cTn id="1" dur="indefinite" restart="never" nodeType="tmRoot"/>
+      </p:par>
+    </p:tnLst>
+  </p:timing>
 </p:sld>
 </file>
 
@@ -7173,8 +7238,13 @@
           <a:p>
             <a:r>
               <a:rPr lang="en-US" dirty="0" smtClean="0"/>
-              <a:t>RDMs are a basic tool in radar</a:t>
-            </a:r>
+              <a:t>RDMs are a </a:t>
+            </a:r>
+            <a:r>
+              <a:rPr lang="en-US" dirty="0" smtClean="0"/>
+              <a:t>2D power map with dimensions of time delay and freq. shift</a:t>
+            </a:r>
+            <a:endParaRPr lang="en-US" dirty="0" smtClean="0"/>
           </a:p>
           <a:p>
             <a:r>
@@ -7196,8 +7266,55 @@
             </a:r>
             <a:r>
               <a:rPr lang="en-US" dirty="0" smtClean="0"/>
-              <a:t> signals are difficult to use for radar due to low power, multipath, and poor autocorrelation properties</a:t>
-            </a:r>
+              <a:t> signals are difficult to use for radar due to low power, multipath, and poor autocorrelation </a:t>
+            </a:r>
+            <a:r>
+              <a:rPr lang="en-US" dirty="0" smtClean="0"/>
+              <a:t>properties</a:t>
+            </a:r>
+          </a:p>
+          <a:p>
+            <a:r>
+              <a:rPr lang="en-US" dirty="0"/>
+              <a:t>Main reference: “</a:t>
+            </a:r>
+            <a:r>
+              <a:rPr lang="en-US" dirty="0" err="1"/>
+              <a:t>WiFi</a:t>
+            </a:r>
+            <a:r>
+              <a:rPr lang="en-US" dirty="0"/>
+              <a:t>-Based Passive </a:t>
+            </a:r>
+            <a:r>
+              <a:rPr lang="en-US" dirty="0" smtClean="0"/>
+              <a:t>Bistatic Radar</a:t>
+            </a:r>
+            <a:r>
+              <a:rPr lang="en-US" dirty="0"/>
+              <a:t>: Data </a:t>
+            </a:r>
+            <a:r>
+              <a:rPr lang="en-US" dirty="0" smtClean="0"/>
+              <a:t>Processing Schemes </a:t>
+            </a:r>
+            <a:r>
+              <a:rPr lang="en-US" dirty="0"/>
+              <a:t>and </a:t>
+            </a:r>
+            <a:r>
+              <a:rPr lang="en-US" dirty="0" smtClean="0"/>
+              <a:t>Experimental Results” by </a:t>
+            </a:r>
+            <a:r>
+              <a:rPr lang="en-US" dirty="0" err="1" smtClean="0"/>
+              <a:t>Colone</a:t>
+            </a:r>
+            <a:r>
+              <a:rPr lang="en-US" dirty="0" smtClean="0"/>
+              <a:t>, et. al</a:t>
+            </a:r>
+            <a:endParaRPr lang="en-US" dirty="0" smtClean="0"/>
           </a:p>
         </p:txBody>
       </p:sp>

</xml_diff>